<commit_message>
fixed navbar formatting, duplicate matches, matches saved to user accounts, removed static names from matches card, expanded saved matches to scroll and show all saved, added handlebars
</commit_message>
<xml_diff>
--- a/assets/PuppyLoveProject2.pptx
+++ b/assets/PuppyLoveProject2.pptx
@@ -113,6 +113,14 @@
       </a:defRPr>
     </a:lvl9pPr>
   </p:defaultTextStyle>
+  <p:extLst>
+    <p:ext uri="{EFAFB233-063F-42B5-8137-9DF3F51BA10A}">
+      <p15:sldGuideLst xmlns:p15="http://schemas.microsoft.com/office/powerpoint/2012/main"/>
+    </p:ext>
+    <p:ext uri="{2D200454-40CA-4A62-9FC3-DE9A4176ACB9}">
+      <p15:notesGuideLst xmlns:p15="http://schemas.microsoft.com/office/powerpoint/2012/main"/>
+    </p:ext>
+  </p:extLst>
 </p:presentation>
 </file>
 
@@ -719,7 +727,7 @@
           <a:p>
             <a:fld id="{2A369EBE-48DC-4DBC-B75C-45CA0BD2AAF6}" type="datetimeFigureOut">
               <a:rPr lang="en-US" smtClean="0"/>
-              <a:t>2/27/2021</a:t>
+              <a:t>2/28/2021</a:t>
             </a:fld>
             <a:endParaRPr lang="en-US"/>
           </a:p>
@@ -1000,7 +1008,7 @@
           <a:p>
             <a:fld id="{2A369EBE-48DC-4DBC-B75C-45CA0BD2AAF6}" type="datetimeFigureOut">
               <a:rPr lang="en-US" smtClean="0"/>
-              <a:t>2/27/2021</a:t>
+              <a:t>2/28/2021</a:t>
             </a:fld>
             <a:endParaRPr lang="en-US"/>
           </a:p>
@@ -1192,7 +1200,7 @@
           <a:p>
             <a:fld id="{2A369EBE-48DC-4DBC-B75C-45CA0BD2AAF6}" type="datetimeFigureOut">
               <a:rPr lang="en-US" smtClean="0"/>
-              <a:t>2/27/2021</a:t>
+              <a:t>2/28/2021</a:t>
             </a:fld>
             <a:endParaRPr lang="en-US"/>
           </a:p>
@@ -1453,7 +1461,7 @@
           <a:p>
             <a:fld id="{2A369EBE-48DC-4DBC-B75C-45CA0BD2AAF6}" type="datetimeFigureOut">
               <a:rPr lang="en-US" smtClean="0"/>
-              <a:t>2/27/2021</a:t>
+              <a:t>2/28/2021</a:t>
             </a:fld>
             <a:endParaRPr lang="en-US"/>
           </a:p>
@@ -1879,7 +1887,7 @@
           <a:p>
             <a:fld id="{2A369EBE-48DC-4DBC-B75C-45CA0BD2AAF6}" type="datetimeFigureOut">
               <a:rPr lang="en-US" smtClean="0"/>
-              <a:t>2/27/2021</a:t>
+              <a:t>2/28/2021</a:t>
             </a:fld>
             <a:endParaRPr lang="en-US"/>
           </a:p>
@@ -2425,7 +2433,7 @@
           <a:p>
             <a:fld id="{2A369EBE-48DC-4DBC-B75C-45CA0BD2AAF6}" type="datetimeFigureOut">
               <a:rPr lang="en-US" smtClean="0"/>
-              <a:t>2/27/2021</a:t>
+              <a:t>2/28/2021</a:t>
             </a:fld>
             <a:endParaRPr lang="en-US"/>
           </a:p>
@@ -3256,7 +3264,7 @@
           <a:p>
             <a:fld id="{2A369EBE-48DC-4DBC-B75C-45CA0BD2AAF6}" type="datetimeFigureOut">
               <a:rPr lang="en-US" smtClean="0"/>
-              <a:t>2/27/2021</a:t>
+              <a:t>2/28/2021</a:t>
             </a:fld>
             <a:endParaRPr lang="en-US"/>
           </a:p>
@@ -3426,7 +3434,7 @@
           <a:p>
             <a:fld id="{2A369EBE-48DC-4DBC-B75C-45CA0BD2AAF6}" type="datetimeFigureOut">
               <a:rPr lang="en-US" smtClean="0"/>
-              <a:t>2/27/2021</a:t>
+              <a:t>2/28/2021</a:t>
             </a:fld>
             <a:endParaRPr lang="en-US"/>
           </a:p>
@@ -3606,7 +3614,7 @@
           <a:p>
             <a:fld id="{2A369EBE-48DC-4DBC-B75C-45CA0BD2AAF6}" type="datetimeFigureOut">
               <a:rPr lang="en-US" smtClean="0"/>
-              <a:t>2/27/2021</a:t>
+              <a:t>2/28/2021</a:t>
             </a:fld>
             <a:endParaRPr lang="en-US"/>
           </a:p>
@@ -3776,7 +3784,7 @@
           <a:p>
             <a:fld id="{2A369EBE-48DC-4DBC-B75C-45CA0BD2AAF6}" type="datetimeFigureOut">
               <a:rPr lang="en-US" smtClean="0"/>
-              <a:t>2/27/2021</a:t>
+              <a:t>2/28/2021</a:t>
             </a:fld>
             <a:endParaRPr lang="en-US"/>
           </a:p>
@@ -4033,7 +4041,7 @@
           <a:p>
             <a:fld id="{2A369EBE-48DC-4DBC-B75C-45CA0BD2AAF6}" type="datetimeFigureOut">
               <a:rPr lang="en-US" smtClean="0"/>
-              <a:t>2/27/2021</a:t>
+              <a:t>2/28/2021</a:t>
             </a:fld>
             <a:endParaRPr lang="en-US"/>
           </a:p>
@@ -4265,7 +4273,7 @@
           <a:p>
             <a:fld id="{2A369EBE-48DC-4DBC-B75C-45CA0BD2AAF6}" type="datetimeFigureOut">
               <a:rPr lang="en-US" smtClean="0"/>
-              <a:t>2/27/2021</a:t>
+              <a:t>2/28/2021</a:t>
             </a:fld>
             <a:endParaRPr lang="en-US"/>
           </a:p>
@@ -4658,7 +4666,7 @@
           <a:p>
             <a:fld id="{2A369EBE-48DC-4DBC-B75C-45CA0BD2AAF6}" type="datetimeFigureOut">
               <a:rPr lang="en-US" smtClean="0"/>
-              <a:t>2/27/2021</a:t>
+              <a:t>2/28/2021</a:t>
             </a:fld>
             <a:endParaRPr lang="en-US"/>
           </a:p>
@@ -4776,7 +4784,7 @@
           <a:p>
             <a:fld id="{2A369EBE-48DC-4DBC-B75C-45CA0BD2AAF6}" type="datetimeFigureOut">
               <a:rPr lang="en-US" smtClean="0"/>
-              <a:t>2/27/2021</a:t>
+              <a:t>2/28/2021</a:t>
             </a:fld>
             <a:endParaRPr lang="en-US"/>
           </a:p>
@@ -4871,7 +4879,7 @@
           <a:p>
             <a:fld id="{2A369EBE-48DC-4DBC-B75C-45CA0BD2AAF6}" type="datetimeFigureOut">
               <a:rPr lang="en-US" smtClean="0"/>
-              <a:t>2/27/2021</a:t>
+              <a:t>2/28/2021</a:t>
             </a:fld>
             <a:endParaRPr lang="en-US"/>
           </a:p>
@@ -5144,7 +5152,7 @@
           <a:p>
             <a:fld id="{2A369EBE-48DC-4DBC-B75C-45CA0BD2AAF6}" type="datetimeFigureOut">
               <a:rPr lang="en-US" smtClean="0"/>
-              <a:t>2/27/2021</a:t>
+              <a:t>2/28/2021</a:t>
             </a:fld>
             <a:endParaRPr lang="en-US"/>
           </a:p>
@@ -5425,7 +5433,7 @@
           <a:p>
             <a:fld id="{2A369EBE-48DC-4DBC-B75C-45CA0BD2AAF6}" type="datetimeFigureOut">
               <a:rPr lang="en-US" smtClean="0"/>
-              <a:t>2/27/2021</a:t>
+              <a:t>2/28/2021</a:t>
             </a:fld>
             <a:endParaRPr lang="en-US"/>
           </a:p>
@@ -5670,7 +5678,7 @@
           <a:p>
             <a:fld id="{2A369EBE-48DC-4DBC-B75C-45CA0BD2AAF6}" type="datetimeFigureOut">
               <a:rPr lang="en-US" smtClean="0"/>
-              <a:t>2/27/2021</a:t>
+              <a:t>2/28/2021</a:t>
             </a:fld>
             <a:endParaRPr lang="en-US"/>
           </a:p>
@@ -6515,7 +6523,7 @@
             </a:pPr>
             <a:r>
               <a:rPr lang="en-US" dirty="0"/>
-              <a:t>As a group of paw loving people, we thought "what better way to join two of peoples favorite pastimes: looking at pictures of furry friends and swiping"!  Whether you are trying to determine what types of dogs you would be interested in to adding to your family or just want to relax by looking through dog photos, this app is for you! With our App you can swipe right to save the image and left to not. You never have to worry about rejection like SOME OTHER apps, these furry friends love everyone!</a:t>
+              <a:t>As a group of paw loving people, we thought "what better way to join two of peoples favorite pastimes: looking at pictures of furry friends and swiping"!  Whether you are trying to determine what types of dogs you would be interested in adding to your family or just want to relax by looking through dog photos, this app is for you! With our App you can swipe right to save the image and left to not. You never have to worry about rejection like SOME OTHER apps, these furry friends love everyone!</a:t>
             </a:r>
           </a:p>
         </p:txBody>
@@ -6650,7 +6658,7 @@
             <a:pPr lvl="1"/>
             <a:r>
               <a:rPr lang="en-US" dirty="0"/>
-              <a:t>I want a find a puppy</a:t>
+              <a:t>I want a find cute pics of pups</a:t>
             </a:r>
           </a:p>
           <a:p>
@@ -6785,6 +6793,12 @@
           </a:p>
           <a:p>
             <a:pPr lvl="1"/>
+            <a:endParaRPr lang="en-US" sz="1500" dirty="0"/>
+          </a:p>
+          <a:p>
+            <a:pPr marL="0" indent="0">
+              <a:buNone/>
+            </a:pPr>
             <a:endParaRPr lang="en-US" sz="1500" dirty="0"/>
           </a:p>
           <a:p>
@@ -7261,7 +7275,7 @@
                 </a:gradFill>
                 <a:latin typeface="Corbel" panose="020B0503020204020204"/>
               </a:rPr>
-              <a:t>APIs</a:t>
+              <a:t>API</a:t>
             </a:r>
           </a:p>
           <a:p>
@@ -7371,39 +7385,6 @@
               </a:rPr>
               <a:t>Sequelize</a:t>
             </a:r>
-            <a:endParaRPr lang="en-US" sz="1500" dirty="0">
-              <a:gradFill>
-                <a:gsLst>
-                  <a:gs pos="34000">
-                    <a:prstClr val="white">
-                      <a:lumMod val="93000"/>
-                    </a:prstClr>
-                  </a:gs>
-                  <a:gs pos="0">
-                    <a:prstClr val="black">
-                      <a:lumMod val="25000"/>
-                      <a:lumOff val="75000"/>
-                    </a:prstClr>
-                  </a:gs>
-                  <a:gs pos="100000">
-                    <a:srgbClr val="94D7E4">
-                      <a:lumMod val="0"/>
-                      <a:lumOff val="100000"/>
-                    </a:srgbClr>
-                  </a:gs>
-                </a:gsLst>
-                <a:lin ang="4800000" scaled="0"/>
-              </a:gradFill>
-              <a:latin typeface="Corbel" panose="020B0503020204020204"/>
-            </a:endParaRPr>
-          </a:p>
-          <a:p>
-            <a:pPr marL="514350" lvl="1" indent="-171450" defTabSz="685800">
-              <a:spcBef>
-                <a:spcPts val="375"/>
-              </a:spcBef>
-              <a:buClrTx/>
-            </a:pPr>
             <a:r>
               <a:rPr lang="en-US" sz="1500" dirty="0">
                 <a:gradFill>
@@ -7430,7 +7411,79 @@
                 </a:gradFill>
                 <a:latin typeface="Corbel" panose="020B0503020204020204"/>
               </a:rPr>
+              <a:t>, SQL Workbench</a:t>
+            </a:r>
+          </a:p>
+          <a:p>
+            <a:pPr marL="514350" lvl="1" indent="-171450" defTabSz="685800">
+              <a:spcBef>
+                <a:spcPts val="375"/>
+              </a:spcBef>
+              <a:buClrTx/>
+            </a:pPr>
+            <a:r>
+              <a:rPr lang="en-US" sz="1500" dirty="0">
+                <a:gradFill>
+                  <a:gsLst>
+                    <a:gs pos="34000">
+                      <a:prstClr val="white">
+                        <a:lumMod val="93000"/>
+                      </a:prstClr>
+                    </a:gs>
+                    <a:gs pos="0">
+                      <a:prstClr val="black">
+                        <a:lumMod val="25000"/>
+                        <a:lumOff val="75000"/>
+                      </a:prstClr>
+                    </a:gs>
+                    <a:gs pos="100000">
+                      <a:srgbClr val="94D7E4">
+                        <a:lumMod val="0"/>
+                        <a:lumOff val="100000"/>
+                      </a:srgbClr>
+                    </a:gs>
+                  </a:gsLst>
+                  <a:lin ang="4800000" scaled="0"/>
+                </a:gradFill>
+                <a:latin typeface="Corbel" panose="020B0503020204020204"/>
+              </a:rPr>
               <a:t>Passport</a:t>
+            </a:r>
+          </a:p>
+          <a:p>
+            <a:pPr marL="514350" lvl="1" indent="-171450" defTabSz="685800">
+              <a:spcBef>
+                <a:spcPts val="375"/>
+              </a:spcBef>
+              <a:buClrTx/>
+            </a:pPr>
+            <a:r>
+              <a:rPr lang="en-US" sz="1500" dirty="0">
+                <a:gradFill>
+                  <a:gsLst>
+                    <a:gs pos="34000">
+                      <a:prstClr val="white">
+                        <a:lumMod val="93000"/>
+                      </a:prstClr>
+                    </a:gs>
+                    <a:gs pos="0">
+                      <a:prstClr val="black">
+                        <a:lumMod val="25000"/>
+                        <a:lumOff val="75000"/>
+                      </a:prstClr>
+                    </a:gs>
+                    <a:gs pos="100000">
+                      <a:srgbClr val="94D7E4">
+                        <a:lumMod val="0"/>
+                        <a:lumOff val="100000"/>
+                      </a:srgbClr>
+                    </a:gs>
+                  </a:gsLst>
+                  <a:lin ang="4800000" scaled="0"/>
+                </a:gradFill>
+                <a:latin typeface="Corbel" panose="020B0503020204020204"/>
+              </a:rPr>
+              <a:t>handlebars</a:t>
             </a:r>
           </a:p>
           <a:p>
@@ -7508,7 +7561,6 @@
               <a:spcBef>
                 <a:spcPts val="375"/>
               </a:spcBef>
-              <a:buClrTx/>
             </a:pPr>
             <a:r>
               <a:rPr lang="en-US" sz="1500" dirty="0">
@@ -7536,7 +7588,7 @@
                 </a:gradFill>
                 <a:latin typeface="Corbel" panose="020B0503020204020204"/>
               </a:rPr>
-              <a:t>Project Scope</a:t>
+              <a:t>Teamwork</a:t>
             </a:r>
           </a:p>
           <a:p>
@@ -7544,7 +7596,6 @@
               <a:spcBef>
                 <a:spcPts val="375"/>
               </a:spcBef>
-              <a:buClrTx/>
             </a:pPr>
             <a:r>
               <a:rPr lang="en-US" sz="1500" dirty="0">
@@ -7572,7 +7623,7 @@
                 </a:gradFill>
                 <a:latin typeface="Corbel" panose="020B0503020204020204"/>
               </a:rPr>
-              <a:t>APIs Search</a:t>
+              <a:t>Pseudocode</a:t>
             </a:r>
           </a:p>
           <a:p>
@@ -7609,78 +7660,6 @@
                 <a:latin typeface="Corbel" panose="020B0503020204020204"/>
               </a:rPr>
               <a:t>Layout</a:t>
-            </a:r>
-          </a:p>
-          <a:p>
-            <a:pPr marL="514350" lvl="1" indent="-171450" defTabSz="685800">
-              <a:spcBef>
-                <a:spcPts val="375"/>
-              </a:spcBef>
-              <a:buClrTx/>
-            </a:pPr>
-            <a:r>
-              <a:rPr lang="en-US" sz="1500" dirty="0">
-                <a:gradFill>
-                  <a:gsLst>
-                    <a:gs pos="34000">
-                      <a:prstClr val="white">
-                        <a:lumMod val="93000"/>
-                      </a:prstClr>
-                    </a:gs>
-                    <a:gs pos="0">
-                      <a:prstClr val="black">
-                        <a:lumMod val="25000"/>
-                        <a:lumOff val="75000"/>
-                      </a:prstClr>
-                    </a:gs>
-                    <a:gs pos="100000">
-                      <a:srgbClr val="94D7E4">
-                        <a:lumMod val="0"/>
-                        <a:lumOff val="100000"/>
-                      </a:srgbClr>
-                    </a:gs>
-                  </a:gsLst>
-                  <a:lin ang="4800000" scaled="0"/>
-                </a:gradFill>
-                <a:latin typeface="Corbel" panose="020B0503020204020204"/>
-              </a:rPr>
-              <a:t>Pseudocode</a:t>
-            </a:r>
-          </a:p>
-          <a:p>
-            <a:pPr marL="514350" lvl="1" indent="-171450" defTabSz="685800">
-              <a:spcBef>
-                <a:spcPts val="375"/>
-              </a:spcBef>
-              <a:buClrTx/>
-            </a:pPr>
-            <a:r>
-              <a:rPr lang="en-US" sz="1500" dirty="0">
-                <a:gradFill>
-                  <a:gsLst>
-                    <a:gs pos="34000">
-                      <a:prstClr val="white">
-                        <a:lumMod val="93000"/>
-                      </a:prstClr>
-                    </a:gs>
-                    <a:gs pos="0">
-                      <a:prstClr val="black">
-                        <a:lumMod val="25000"/>
-                        <a:lumOff val="75000"/>
-                      </a:prstClr>
-                    </a:gs>
-                    <a:gs pos="100000">
-                      <a:srgbClr val="94D7E4">
-                        <a:lumMod val="0"/>
-                        <a:lumOff val="100000"/>
-                      </a:srgbClr>
-                    </a:gs>
-                  </a:gsLst>
-                  <a:lin ang="4800000" scaled="0"/>
-                </a:gradFill>
-                <a:latin typeface="Corbel" panose="020B0503020204020204"/>
-              </a:rPr>
-              <a:t>Teamwork</a:t>
             </a:r>
           </a:p>
           <a:p>
@@ -7948,6 +7927,36 @@
           </a:p>
         </p:txBody>
       </p:sp>
+      <p:pic>
+        <p:nvPicPr>
+          <p:cNvPr id="4" name="Picture 3">
+            <a:extLst>
+              <a:ext uri="{FF2B5EF4-FFF2-40B4-BE49-F238E27FC236}">
+                <a16:creationId xmlns:a16="http://schemas.microsoft.com/office/drawing/2014/main" id="{25F413B6-3F7B-4C4C-852D-6A0F6515034B}"/>
+              </a:ext>
+            </a:extLst>
+          </p:cNvPr>
+          <p:cNvPicPr>
+            <a:picLocks noChangeAspect="1"/>
+          </p:cNvPicPr>
+          <p:nvPr/>
+        </p:nvPicPr>
+        <p:blipFill>
+          <a:blip r:embed="rId2"/>
+          <a:stretch>
+            <a:fillRect/>
+          </a:stretch>
+        </p:blipFill>
+        <p:spPr>
+          <a:xfrm>
+            <a:off x="922020" y="873177"/>
+            <a:ext cx="7484896" cy="3397145"/>
+          </a:xfrm>
+          <a:prstGeom prst="rect">
+            <a:avLst/>
+          </a:prstGeom>
+        </p:spPr>
+      </p:pic>
     </p:spTree>
     <p:extLst>
       <p:ext uri="{BB962C8B-B14F-4D97-AF65-F5344CB8AC3E}">
@@ -8078,6 +8087,14 @@
               <a:rPr lang="en-US" sz="2000" dirty="0"/>
               <a:t>    Save user posts </a:t>
             </a:r>
+          </a:p>
+          <a:p>
+            <a:r>
+              <a:rPr lang="en-US" sz="2000" dirty="0"/>
+              <a:t>    Expand usage of API</a:t>
+            </a:r>
+          </a:p>
+          <a:p>
             <a:endParaRPr lang="en-US" dirty="0"/>
           </a:p>
           <a:p>

</xml_diff>